<commit_message>
1.9.2 - Minor Bugs
</commit_message>
<xml_diff>
--- a/CarboLifeCalc/Resources/DV_CarboCalcReporting.pptx
+++ b/CarboLifeCalc/Resources/DV_CarboCalcReporting.pptx
@@ -536,7 +536,7 @@
             <a:fld id="{B5D9EB1F-1062-4E64-9DED-C7BE8B770281}" type="datetimeFigureOut">
               <a:rPr lang="en-GB" smtClean="0"/>
               <a:pPr/>
-              <a:t>14/10/2025</a:t>
+              <a:t>20/10/2025</a:t>
             </a:fld>
             <a:endParaRPr lang="en-GB" dirty="0"/>
           </a:p>
@@ -940,7 +940,7 @@
           <a:p>
             <a:fld id="{163DE3BF-E3FE-41CB-9CC8-04CC329604A2}" type="datetimeFigureOut">
               <a:rPr lang="en-GB" smtClean="0"/>
-              <a:t>14/10/2025</a:t>
+              <a:t>20/10/2025</a:t>
             </a:fld>
             <a:endParaRPr lang="en-GB"/>
           </a:p>
@@ -1110,7 +1110,7 @@
           <a:p>
             <a:fld id="{163DE3BF-E3FE-41CB-9CC8-04CC329604A2}" type="datetimeFigureOut">
               <a:rPr lang="en-GB" smtClean="0"/>
-              <a:t>14/10/2025</a:t>
+              <a:t>20/10/2025</a:t>
             </a:fld>
             <a:endParaRPr lang="en-GB"/>
           </a:p>
@@ -1290,7 +1290,7 @@
           <a:p>
             <a:fld id="{163DE3BF-E3FE-41CB-9CC8-04CC329604A2}" type="datetimeFigureOut">
               <a:rPr lang="en-GB" smtClean="0"/>
-              <a:t>14/10/2025</a:t>
+              <a:t>20/10/2025</a:t>
             </a:fld>
             <a:endParaRPr lang="en-GB"/>
           </a:p>
@@ -1460,7 +1460,7 @@
           <a:p>
             <a:fld id="{163DE3BF-E3FE-41CB-9CC8-04CC329604A2}" type="datetimeFigureOut">
               <a:rPr lang="en-GB" smtClean="0"/>
-              <a:t>14/10/2025</a:t>
+              <a:t>20/10/2025</a:t>
             </a:fld>
             <a:endParaRPr lang="en-GB"/>
           </a:p>
@@ -1706,7 +1706,7 @@
           <a:p>
             <a:fld id="{163DE3BF-E3FE-41CB-9CC8-04CC329604A2}" type="datetimeFigureOut">
               <a:rPr lang="en-GB" smtClean="0"/>
-              <a:t>14/10/2025</a:t>
+              <a:t>20/10/2025</a:t>
             </a:fld>
             <a:endParaRPr lang="en-GB"/>
           </a:p>
@@ -1938,7 +1938,7 @@
           <a:p>
             <a:fld id="{163DE3BF-E3FE-41CB-9CC8-04CC329604A2}" type="datetimeFigureOut">
               <a:rPr lang="en-GB" smtClean="0"/>
-              <a:t>14/10/2025</a:t>
+              <a:t>20/10/2025</a:t>
             </a:fld>
             <a:endParaRPr lang="en-GB"/>
           </a:p>
@@ -2305,7 +2305,7 @@
           <a:p>
             <a:fld id="{163DE3BF-E3FE-41CB-9CC8-04CC329604A2}" type="datetimeFigureOut">
               <a:rPr lang="en-GB" smtClean="0"/>
-              <a:t>14/10/2025</a:t>
+              <a:t>20/10/2025</a:t>
             </a:fld>
             <a:endParaRPr lang="en-GB"/>
           </a:p>
@@ -2423,7 +2423,7 @@
           <a:p>
             <a:fld id="{163DE3BF-E3FE-41CB-9CC8-04CC329604A2}" type="datetimeFigureOut">
               <a:rPr lang="en-GB" smtClean="0"/>
-              <a:t>14/10/2025</a:t>
+              <a:t>20/10/2025</a:t>
             </a:fld>
             <a:endParaRPr lang="en-GB"/>
           </a:p>
@@ -2518,7 +2518,7 @@
           <a:p>
             <a:fld id="{163DE3BF-E3FE-41CB-9CC8-04CC329604A2}" type="datetimeFigureOut">
               <a:rPr lang="en-GB" smtClean="0"/>
-              <a:t>14/10/2025</a:t>
+              <a:t>20/10/2025</a:t>
             </a:fld>
             <a:endParaRPr lang="en-GB"/>
           </a:p>
@@ -2795,7 +2795,7 @@
           <a:p>
             <a:fld id="{163DE3BF-E3FE-41CB-9CC8-04CC329604A2}" type="datetimeFigureOut">
               <a:rPr lang="en-GB" smtClean="0"/>
-              <a:t>14/10/2025</a:t>
+              <a:t>20/10/2025</a:t>
             </a:fld>
             <a:endParaRPr lang="en-GB"/>
           </a:p>
@@ -3052,7 +3052,7 @@
           <a:p>
             <a:fld id="{163DE3BF-E3FE-41CB-9CC8-04CC329604A2}" type="datetimeFigureOut">
               <a:rPr lang="en-GB" smtClean="0"/>
-              <a:t>14/10/2025</a:t>
+              <a:t>20/10/2025</a:t>
             </a:fld>
             <a:endParaRPr lang="en-GB"/>
           </a:p>
@@ -3267,7 +3267,7 @@
             <a:fld id="{163DE3BF-E3FE-41CB-9CC8-04CC329604A2}" type="datetimeFigureOut">
               <a:rPr lang="en-GB" smtClean="0"/>
               <a:pPr/>
-              <a:t>14/10/2025</a:t>
+              <a:t>20/10/2025</a:t>
             </a:fld>
             <a:endParaRPr lang="en-GB" dirty="0"/>
           </a:p>
@@ -19117,60 +19117,12 @@
           <a:chExt cx="0" cy="0"/>
         </a:xfrm>
       </p:grpSpPr>
-      <p:sp>
-        <p:nvSpPr>
-          <p:cNvPr id="7" name="TextBox 6">
-            <a:extLst>
-              <a:ext uri="{FF2B5EF4-FFF2-40B4-BE49-F238E27FC236}">
-                <a16:creationId xmlns:a16="http://schemas.microsoft.com/office/drawing/2014/main" id="{57373ECB-25A8-BD77-1D52-99D4CBC0937A}"/>
-              </a:ext>
-            </a:extLst>
-          </p:cNvPr>
-          <p:cNvSpPr txBox="1"/>
-          <p:nvPr/>
-        </p:nvSpPr>
-        <p:spPr>
-          <a:xfrm>
-            <a:off x="348751" y="419190"/>
-            <a:ext cx="2470020" cy="707886"/>
-          </a:xfrm>
-          <a:prstGeom prst="rect">
-            <a:avLst/>
-          </a:prstGeom>
-          <a:noFill/>
-        </p:spPr>
-        <p:txBody>
-          <a:bodyPr wrap="square" rtlCol="0">
-            <a:spAutoFit/>
-          </a:bodyPr>
-          <a:lstStyle/>
-          <a:p>
-            <a:r>
-              <a:rPr lang="en-GB" sz="2000" b="1" dirty="0">
-                <a:solidFill>
-                  <a:srgbClr val="DF5429"/>
-                </a:solidFill>
-                <a:latin typeface="Abadi" panose="020B0604020104020204" pitchFamily="34" charset="0"/>
-              </a:rPr>
-              <a:t>Carbo Life</a:t>
-            </a:r>
-          </a:p>
-          <a:p>
-            <a:r>
-              <a:rPr lang="en-GB" sz="2000" dirty="0">
-                <a:latin typeface="Abadi" panose="020B0604020104020204" pitchFamily="34" charset="0"/>
-              </a:rPr>
-              <a:t>Content</a:t>
-            </a:r>
-          </a:p>
-        </p:txBody>
-      </p:sp>
       <p:pic>
         <p:nvPicPr>
-          <p:cNvPr id="5" name="Picture 4" descr="A logo with a black and white design&#10;&#10;AI-generated content may be incorrect.">
-            <a:extLst>
-              <a:ext uri="{FF2B5EF4-FFF2-40B4-BE49-F238E27FC236}">
-                <a16:creationId xmlns:a16="http://schemas.microsoft.com/office/drawing/2014/main" id="{B68ECD10-70F6-7492-07EF-EC8D598C0BF3}"/>
+          <p:cNvPr id="4" name="Picture 3" descr="A building on stilts with red and yellow frames&#10;&#10;AI-generated content may be incorrect.">
+            <a:extLst>
+              <a:ext uri="{FF2B5EF4-FFF2-40B4-BE49-F238E27FC236}">
+                <a16:creationId xmlns:a16="http://schemas.microsoft.com/office/drawing/2014/main" id="{6102FCBF-575F-D4C9-98E7-06CE419D9E5B}"/>
               </a:ext>
             </a:extLst>
           </p:cNvPr>
@@ -19181,42 +19133,6 @@
         </p:nvPicPr>
         <p:blipFill>
           <a:blip r:embed="rId2">
-            <a:extLst>
-              <a:ext uri="{28A0092B-C50C-407E-A947-70E740481C1C}">
-                <a14:useLocalDpi xmlns:a14="http://schemas.microsoft.com/office/drawing/2010/main" val="0"/>
-              </a:ext>
-            </a:extLst>
-          </a:blip>
-          <a:stretch>
-            <a:fillRect/>
-          </a:stretch>
-        </p:blipFill>
-        <p:spPr>
-          <a:xfrm>
-            <a:off x="11173184" y="6270010"/>
-            <a:ext cx="893204" cy="366353"/>
-          </a:xfrm>
-          <a:prstGeom prst="rect">
-            <a:avLst/>
-          </a:prstGeom>
-        </p:spPr>
-      </p:pic>
-      <p:pic>
-        <p:nvPicPr>
-          <p:cNvPr id="4" name="Picture 3" descr="A building on stilts with red and yellow frames&#10;&#10;AI-generated content may be incorrect.">
-            <a:extLst>
-              <a:ext uri="{FF2B5EF4-FFF2-40B4-BE49-F238E27FC236}">
-                <a16:creationId xmlns:a16="http://schemas.microsoft.com/office/drawing/2014/main" id="{6102FCBF-575F-D4C9-98E7-06CE419D9E5B}"/>
-              </a:ext>
-            </a:extLst>
-          </p:cNvPr>
-          <p:cNvPicPr>
-            <a:picLocks noChangeAspect="1"/>
-          </p:cNvPicPr>
-          <p:nvPr/>
-        </p:nvPicPr>
-        <p:blipFill>
-          <a:blip r:embed="rId3">
             <a:extLst>
               <a:ext uri="{28A0092B-C50C-407E-A947-70E740481C1C}">
                 <a14:useLocalDpi xmlns:a14="http://schemas.microsoft.com/office/drawing/2010/main" val="0"/>

</xml_diff>